<commit_message>
Added short paper rough draft
</commit_message>
<xml_diff>
--- a/presentation/CGT610_Presentation_IzzaTariq.pptx
+++ b/presentation/CGT610_Presentation_IzzaTariq.pptx
@@ -220,7 +220,7 @@
           <a:p>
             <a:fld id="{0EE1AA0D-0C5B-47A3-BADD-C7F0397D0F94}" type="datetimeFigureOut">
               <a:rPr lang="en-US" smtClean="0"/>
-              <a:t>4/25/2019</a:t>
+              <a:t>4/27/2019</a:t>
             </a:fld>
             <a:endParaRPr lang="en-US"/>
           </a:p>
@@ -2453,7 +2453,7 @@
           <a:p>
             <a:fld id="{877DDEC6-557D-4AD6-B48D-8CF06E8710A1}" type="datetimeFigureOut">
               <a:rPr lang="en-US" smtClean="0"/>
-              <a:t>4/25/2019</a:t>
+              <a:t>4/27/2019</a:t>
             </a:fld>
             <a:endParaRPr lang="en-US"/>
           </a:p>
@@ -2651,7 +2651,7 @@
           <a:p>
             <a:fld id="{877DDEC6-557D-4AD6-B48D-8CF06E8710A1}" type="datetimeFigureOut">
               <a:rPr lang="en-US" smtClean="0"/>
-              <a:t>4/25/2019</a:t>
+              <a:t>4/27/2019</a:t>
             </a:fld>
             <a:endParaRPr lang="en-US"/>
           </a:p>
@@ -2859,7 +2859,7 @@
           <a:p>
             <a:fld id="{877DDEC6-557D-4AD6-B48D-8CF06E8710A1}" type="datetimeFigureOut">
               <a:rPr lang="en-US" smtClean="0"/>
-              <a:t>4/25/2019</a:t>
+              <a:t>4/27/2019</a:t>
             </a:fld>
             <a:endParaRPr lang="en-US"/>
           </a:p>
@@ -3057,7 +3057,7 @@
           <a:p>
             <a:fld id="{877DDEC6-557D-4AD6-B48D-8CF06E8710A1}" type="datetimeFigureOut">
               <a:rPr lang="en-US" smtClean="0"/>
-              <a:t>4/25/2019</a:t>
+              <a:t>4/27/2019</a:t>
             </a:fld>
             <a:endParaRPr lang="en-US"/>
           </a:p>
@@ -3332,7 +3332,7 @@
           <a:p>
             <a:fld id="{877DDEC6-557D-4AD6-B48D-8CF06E8710A1}" type="datetimeFigureOut">
               <a:rPr lang="en-US" smtClean="0"/>
-              <a:t>4/25/2019</a:t>
+              <a:t>4/27/2019</a:t>
             </a:fld>
             <a:endParaRPr lang="en-US"/>
           </a:p>
@@ -3597,7 +3597,7 @@
           <a:p>
             <a:fld id="{877DDEC6-557D-4AD6-B48D-8CF06E8710A1}" type="datetimeFigureOut">
               <a:rPr lang="en-US" smtClean="0"/>
-              <a:t>4/25/2019</a:t>
+              <a:t>4/27/2019</a:t>
             </a:fld>
             <a:endParaRPr lang="en-US"/>
           </a:p>
@@ -4009,7 +4009,7 @@
           <a:p>
             <a:fld id="{877DDEC6-557D-4AD6-B48D-8CF06E8710A1}" type="datetimeFigureOut">
               <a:rPr lang="en-US" smtClean="0"/>
-              <a:t>4/25/2019</a:t>
+              <a:t>4/27/2019</a:t>
             </a:fld>
             <a:endParaRPr lang="en-US"/>
           </a:p>
@@ -4150,7 +4150,7 @@
           <a:p>
             <a:fld id="{877DDEC6-557D-4AD6-B48D-8CF06E8710A1}" type="datetimeFigureOut">
               <a:rPr lang="en-US" smtClean="0"/>
-              <a:t>4/25/2019</a:t>
+              <a:t>4/27/2019</a:t>
             </a:fld>
             <a:endParaRPr lang="en-US"/>
           </a:p>
@@ -4263,7 +4263,7 @@
           <a:p>
             <a:fld id="{877DDEC6-557D-4AD6-B48D-8CF06E8710A1}" type="datetimeFigureOut">
               <a:rPr lang="en-US" smtClean="0"/>
-              <a:t>4/25/2019</a:t>
+              <a:t>4/27/2019</a:t>
             </a:fld>
             <a:endParaRPr lang="en-US"/>
           </a:p>
@@ -4574,7 +4574,7 @@
           <a:p>
             <a:fld id="{877DDEC6-557D-4AD6-B48D-8CF06E8710A1}" type="datetimeFigureOut">
               <a:rPr lang="en-US" smtClean="0"/>
-              <a:t>4/25/2019</a:t>
+              <a:t>4/27/2019</a:t>
             </a:fld>
             <a:endParaRPr lang="en-US"/>
           </a:p>
@@ -4862,7 +4862,7 @@
           <a:p>
             <a:fld id="{877DDEC6-557D-4AD6-B48D-8CF06E8710A1}" type="datetimeFigureOut">
               <a:rPr lang="en-US" smtClean="0"/>
-              <a:t>4/25/2019</a:t>
+              <a:t>4/27/2019</a:t>
             </a:fld>
             <a:endParaRPr lang="en-US"/>
           </a:p>
@@ -5103,7 +5103,7 @@
           <a:p>
             <a:fld id="{877DDEC6-557D-4AD6-B48D-8CF06E8710A1}" type="datetimeFigureOut">
               <a:rPr lang="en-US" smtClean="0"/>
-              <a:t>4/25/2019</a:t>
+              <a:t>4/27/2019</a:t>
             </a:fld>
             <a:endParaRPr lang="en-US"/>
           </a:p>
@@ -9668,7 +9668,7 @@
                   <a:srgbClr val="00B050"/>
                 </a:solidFill>
               </a:rPr>
-              <a:t>Discrete geometric texture elements (</a:t>
+              <a:t>Identical discrete geometric texture elements (</a:t>
             </a:r>
             <a:r>
               <a:rPr lang="en-US" dirty="0" err="1">

</xml_diff>